<commit_message>
final comit of the presentation and PBI model
</commit_message>
<xml_diff>
--- a/Presentation.pptx
+++ b/Presentation.pptx
@@ -5,7 +5,14 @@
     <p:sldMasterId id="2147483648" r:id="rId1"/>
   </p:sldMasterIdLst>
   <p:sldIdLst>
-    <p:sldId id="257" r:id="rId2"/>
+    <p:sldId id="259" r:id="rId2"/>
+    <p:sldId id="261" r:id="rId3"/>
+    <p:sldId id="262" r:id="rId4"/>
+    <p:sldId id="260" r:id="rId5"/>
+    <p:sldId id="257" r:id="rId6"/>
+    <p:sldId id="258" r:id="rId7"/>
+    <p:sldId id="264" r:id="rId8"/>
+    <p:sldId id="263" r:id="rId9"/>
   </p:sldIdLst>
   <p:sldSz cx="12192000" cy="6858000"/>
   <p:notesSz cx="6858000" cy="9144000"/>
@@ -104,6 +111,11 @@
       </a:defRPr>
     </a:lvl9pPr>
   </p:defaultTextStyle>
+  <p:extLst>
+    <p:ext uri="{EFAFB233-063F-42B5-8137-9DF3F51BA10A}">
+      <p15:sldGuideLst xmlns:p15="http://schemas.microsoft.com/office/powerpoint/2012/main"/>
+    </p:ext>
+  </p:extLst>
 </p:presentation>
 </file>
 
@@ -3326,7 +3338,7 @@
           <p:cNvPr id="2" name="Title 1">
             <a:extLst>
               <a:ext uri="{FF2B5EF4-FFF2-40B4-BE49-F238E27FC236}">
-                <a16:creationId xmlns:a16="http://schemas.microsoft.com/office/drawing/2014/main" id="{672ECE5C-1517-4F42-9343-45AA8C684D15}"/>
+                <a16:creationId xmlns:a16="http://schemas.microsoft.com/office/drawing/2014/main" id="{839AC1C4-421E-47A7-A742-B1C9601674DF}"/>
               </a:ext>
             </a:extLst>
           </p:cNvPr>
@@ -3344,17 +3356,162 @@
           <a:p>
             <a:r>
               <a:rPr lang="en-US" dirty="0"/>
-              <a:t>Final Model</a:t>
-            </a:r>
+              <a:t>Infrastructure</a:t>
+            </a:r>
+          </a:p>
+        </p:txBody>
+      </p:sp>
+      <p:sp>
+        <p:nvSpPr>
+          <p:cNvPr id="3" name="Content Placeholder 2">
+            <a:extLst>
+              <a:ext uri="{FF2B5EF4-FFF2-40B4-BE49-F238E27FC236}">
+                <a16:creationId xmlns:a16="http://schemas.microsoft.com/office/drawing/2014/main" id="{51AF6947-4F1A-407C-8B8B-CE22B0D8B91C}"/>
+              </a:ext>
+            </a:extLst>
+          </p:cNvPr>
+          <p:cNvSpPr>
+            <a:spLocks noGrp="1"/>
+          </p:cNvSpPr>
+          <p:nvPr>
+            <p:ph idx="1"/>
+          </p:nvPr>
+        </p:nvSpPr>
+        <p:spPr>
+          <a:xfrm>
+            <a:off x="548368" y="1523546"/>
+            <a:ext cx="5623832" cy="4351338"/>
+          </a:xfrm>
+        </p:spPr>
+        <p:txBody>
+          <a:bodyPr>
+            <a:normAutofit fontScale="92500" lnSpcReduction="20000"/>
+          </a:bodyPr>
+          <a:lstStyle/>
+          <a:p>
+            <a:r>
+              <a:rPr lang="en-US" dirty="0"/>
+              <a:t>3 databases</a:t>
+            </a:r>
+          </a:p>
+          <a:p>
+            <a:pPr lvl="1"/>
+            <a:r>
+              <a:rPr lang="en-US" dirty="0"/>
+              <a:t>Staging/</a:t>
+            </a:r>
+            <a:r>
+              <a:rPr lang="en-US" dirty="0" err="1"/>
+              <a:t>silver_layer</a:t>
+            </a:r>
+            <a:r>
+              <a:rPr lang="en-US" dirty="0"/>
+              <a:t>: bring data from online file via python</a:t>
+            </a:r>
+          </a:p>
+          <a:p>
+            <a:pPr lvl="2"/>
+            <a:r>
+              <a:rPr lang="en-US" dirty="0"/>
+              <a:t>2 schemas, staging and </a:t>
+            </a:r>
+            <a:r>
+              <a:rPr lang="en-US" dirty="0" err="1"/>
+              <a:t>dbo</a:t>
+            </a:r>
+            <a:r>
+              <a:rPr lang="en-US" dirty="0"/>
+              <a:t>.</a:t>
+            </a:r>
+          </a:p>
+          <a:p>
+            <a:pPr lvl="2"/>
+            <a:r>
+              <a:rPr lang="en-US" dirty="0"/>
+              <a:t>Upload data to staging, then merge into </a:t>
+            </a:r>
+            <a:r>
+              <a:rPr lang="en-US" dirty="0" err="1"/>
+              <a:t>dbo</a:t>
+            </a:r>
+            <a:endParaRPr lang="en-US" dirty="0"/>
+          </a:p>
+          <a:p>
+            <a:pPr lvl="1"/>
+            <a:r>
+              <a:rPr lang="en-US" dirty="0"/>
+              <a:t>DWH/</a:t>
+            </a:r>
+            <a:r>
+              <a:rPr lang="en-US" dirty="0" err="1"/>
+              <a:t>gold_layer</a:t>
+            </a:r>
+            <a:r>
+              <a:rPr lang="en-US" dirty="0"/>
+              <a:t>: dim/fact structure</a:t>
+            </a:r>
+          </a:p>
+          <a:p>
+            <a:pPr lvl="2"/>
+            <a:r>
+              <a:rPr lang="en-US" dirty="0"/>
+              <a:t>Only 1 schema. Right now, we drop and recreate the tables every time. </a:t>
+            </a:r>
+            <a:r>
+              <a:rPr lang="en-US" dirty="0">
+                <a:sym typeface="Wingdings" panose="05000000000000000000" pitchFamily="2" charset="2"/>
+              </a:rPr>
+              <a:t> Can go with incremental load if necessary</a:t>
+            </a:r>
+          </a:p>
+          <a:p>
+            <a:pPr lvl="2"/>
+            <a:r>
+              <a:rPr lang="en-US" dirty="0">
+                <a:sym typeface="Wingdings" panose="05000000000000000000" pitchFamily="2" charset="2"/>
+              </a:rPr>
+              <a:t>25_view_layer. Views on top of </a:t>
+            </a:r>
+            <a:r>
+              <a:rPr lang="en-US" dirty="0" err="1">
+                <a:sym typeface="Wingdings" panose="05000000000000000000" pitchFamily="2" charset="2"/>
+              </a:rPr>
+              <a:t>dbo</a:t>
+            </a:r>
+            <a:r>
+              <a:rPr lang="en-US" dirty="0">
+                <a:sym typeface="Wingdings" panose="05000000000000000000" pitchFamily="2" charset="2"/>
+              </a:rPr>
+              <a:t> schema to make adding calculated columns easier. Model queries from 25_view_layer.</a:t>
+            </a:r>
+          </a:p>
+          <a:p>
+            <a:pPr lvl="1"/>
+            <a:r>
+              <a:rPr lang="en-US" dirty="0">
+                <a:sym typeface="Wingdings" panose="05000000000000000000" pitchFamily="2" charset="2"/>
+              </a:rPr>
+              <a:t>Logs</a:t>
+            </a:r>
+          </a:p>
+          <a:p>
+            <a:pPr lvl="2"/>
+            <a:r>
+              <a:rPr lang="en-US" dirty="0">
+                <a:sym typeface="Wingdings" panose="05000000000000000000" pitchFamily="2" charset="2"/>
+              </a:rPr>
+              <a:t>Logging anything that we can regarding the upload process, either in python or through user stored procedures</a:t>
+            </a:r>
+            <a:endParaRPr lang="en-US" dirty="0"/>
           </a:p>
         </p:txBody>
       </p:sp>
       <p:pic>
         <p:nvPicPr>
-          <p:cNvPr id="5" name="Picture 4">
-            <a:extLst>
-              <a:ext uri="{FF2B5EF4-FFF2-40B4-BE49-F238E27FC236}">
-                <a16:creationId xmlns:a16="http://schemas.microsoft.com/office/drawing/2014/main" id="{9296E446-BF82-4709-949C-D4E8533D9063}"/>
+          <p:cNvPr id="7" name="Picture 6">
+            <a:extLst>
+              <a:ext uri="{FF2B5EF4-FFF2-40B4-BE49-F238E27FC236}">
+                <a16:creationId xmlns:a16="http://schemas.microsoft.com/office/drawing/2014/main" id="{0F64F0AC-74A6-45E3-B545-D6F70C560B1E}"/>
               </a:ext>
             </a:extLst>
           </p:cNvPr>
@@ -3371,14 +3528,505 @@
         </p:blipFill>
         <p:spPr>
           <a:xfrm>
-            <a:off x="729749" y="1477817"/>
-            <a:ext cx="3439516" cy="4636655"/>
+            <a:off x="7725494" y="365125"/>
+            <a:ext cx="1695481" cy="6202218"/>
           </a:xfrm>
           <a:prstGeom prst="rect">
             <a:avLst/>
           </a:prstGeom>
         </p:spPr>
       </p:pic>
+    </p:spTree>
+    <p:extLst>
+      <p:ext uri="{BB962C8B-B14F-4D97-AF65-F5344CB8AC3E}">
+        <p14:creationId xmlns:p14="http://schemas.microsoft.com/office/powerpoint/2010/main" val="3542347189"/>
+      </p:ext>
+    </p:extLst>
+  </p:cSld>
+  <p:clrMapOvr>
+    <a:masterClrMapping/>
+  </p:clrMapOvr>
+</p:sld>
+</file>
+
+<file path=ppt/slides/slide2.xml><?xml version="1.0" encoding="utf-8"?>
+<p:sld xmlns:a="http://schemas.openxmlformats.org/drawingml/2006/main" xmlns:r="http://schemas.openxmlformats.org/officeDocument/2006/relationships" xmlns:p="http://schemas.openxmlformats.org/presentationml/2006/main">
+  <p:cSld>
+    <p:spTree>
+      <p:nvGrpSpPr>
+        <p:cNvPr id="1" name=""/>
+        <p:cNvGrpSpPr/>
+        <p:nvPr/>
+      </p:nvGrpSpPr>
+      <p:grpSpPr>
+        <a:xfrm>
+          <a:off x="0" y="0"/>
+          <a:ext cx="0" cy="0"/>
+          <a:chOff x="0" y="0"/>
+          <a:chExt cx="0" cy="0"/>
+        </a:xfrm>
+      </p:grpSpPr>
+      <p:sp>
+        <p:nvSpPr>
+          <p:cNvPr id="2" name="Title 1">
+            <a:extLst>
+              <a:ext uri="{FF2B5EF4-FFF2-40B4-BE49-F238E27FC236}">
+                <a16:creationId xmlns:a16="http://schemas.microsoft.com/office/drawing/2014/main" id="{D13E4023-C217-472A-9369-95CC47DB7138}"/>
+              </a:ext>
+            </a:extLst>
+          </p:cNvPr>
+          <p:cNvSpPr>
+            <a:spLocks noGrp="1"/>
+          </p:cNvSpPr>
+          <p:nvPr>
+            <p:ph type="title"/>
+          </p:nvPr>
+        </p:nvSpPr>
+        <p:spPr/>
+        <p:txBody>
+          <a:bodyPr/>
+          <a:lstStyle/>
+          <a:p>
+            <a:r>
+              <a:rPr lang="en-US" dirty="0"/>
+              <a:t>Ingestion</a:t>
+            </a:r>
+          </a:p>
+        </p:txBody>
+      </p:sp>
+      <p:sp>
+        <p:nvSpPr>
+          <p:cNvPr id="3" name="Content Placeholder 2">
+            <a:extLst>
+              <a:ext uri="{FF2B5EF4-FFF2-40B4-BE49-F238E27FC236}">
+                <a16:creationId xmlns:a16="http://schemas.microsoft.com/office/drawing/2014/main" id="{4666CB70-B556-42A6-9541-E83721D876E5}"/>
+              </a:ext>
+            </a:extLst>
+          </p:cNvPr>
+          <p:cNvSpPr>
+            <a:spLocks noGrp="1"/>
+          </p:cNvSpPr>
+          <p:nvPr>
+            <p:ph idx="1"/>
+          </p:nvPr>
+        </p:nvSpPr>
+        <p:spPr/>
+        <p:txBody>
+          <a:bodyPr/>
+          <a:lstStyle/>
+          <a:p>
+            <a:r>
+              <a:rPr lang="en-US" dirty="0"/>
+              <a:t>Python ingest, C# was not dealing well with .json.gz files.</a:t>
+            </a:r>
+          </a:p>
+          <a:p>
+            <a:pPr lvl="1"/>
+            <a:r>
+              <a:rPr lang="en-US" dirty="0"/>
+              <a:t>Really versatile with data frame objects, manipulation of heavy data sets through pandas</a:t>
+            </a:r>
+          </a:p>
+          <a:p>
+            <a:pPr lvl="1"/>
+            <a:r>
+              <a:rPr lang="en-US" dirty="0"/>
+              <a:t>Drawback is currently we are doing row by row insert, which needs to be optimized. Look into </a:t>
+            </a:r>
+            <a:r>
+              <a:rPr lang="en-US" dirty="0" err="1"/>
+              <a:t>pyodbc.fast_executemany</a:t>
+            </a:r>
+            <a:r>
+              <a:rPr lang="en-US" dirty="0"/>
+              <a:t> / </a:t>
+            </a:r>
+            <a:r>
+              <a:rPr lang="en-US" dirty="0" err="1"/>
+              <a:t>pyspark</a:t>
+            </a:r>
+            <a:endParaRPr lang="en-US" dirty="0"/>
+          </a:p>
+          <a:p>
+            <a:r>
+              <a:rPr lang="en-US" dirty="0"/>
+              <a:t>Already manipulate the data into 6 distinct data frames. Inserting these in their respective staging tables in staging db.</a:t>
+            </a:r>
+          </a:p>
+        </p:txBody>
+      </p:sp>
+    </p:spTree>
+    <p:extLst>
+      <p:ext uri="{BB962C8B-B14F-4D97-AF65-F5344CB8AC3E}">
+        <p14:creationId xmlns:p14="http://schemas.microsoft.com/office/powerpoint/2010/main" val="2453674702"/>
+      </p:ext>
+    </p:extLst>
+  </p:cSld>
+  <p:clrMapOvr>
+    <a:masterClrMapping/>
+  </p:clrMapOvr>
+</p:sld>
+</file>
+
+<file path=ppt/slides/slide3.xml><?xml version="1.0" encoding="utf-8"?>
+<p:sld xmlns:a="http://schemas.openxmlformats.org/drawingml/2006/main" xmlns:r="http://schemas.openxmlformats.org/officeDocument/2006/relationships" xmlns:p="http://schemas.openxmlformats.org/presentationml/2006/main">
+  <p:cSld>
+    <p:spTree>
+      <p:nvGrpSpPr>
+        <p:cNvPr id="1" name=""/>
+        <p:cNvGrpSpPr/>
+        <p:nvPr/>
+      </p:nvGrpSpPr>
+      <p:grpSpPr>
+        <a:xfrm>
+          <a:off x="0" y="0"/>
+          <a:ext cx="0" cy="0"/>
+          <a:chOff x="0" y="0"/>
+          <a:chExt cx="0" cy="0"/>
+        </a:xfrm>
+      </p:grpSpPr>
+      <p:sp>
+        <p:nvSpPr>
+          <p:cNvPr id="2" name="Title 1">
+            <a:extLst>
+              <a:ext uri="{FF2B5EF4-FFF2-40B4-BE49-F238E27FC236}">
+                <a16:creationId xmlns:a16="http://schemas.microsoft.com/office/drawing/2014/main" id="{341CB4C5-D837-400F-805E-C9B837138873}"/>
+              </a:ext>
+            </a:extLst>
+          </p:cNvPr>
+          <p:cNvSpPr>
+            <a:spLocks noGrp="1"/>
+          </p:cNvSpPr>
+          <p:nvPr>
+            <p:ph type="title"/>
+          </p:nvPr>
+        </p:nvSpPr>
+        <p:spPr/>
+        <p:txBody>
+          <a:bodyPr/>
+          <a:lstStyle/>
+          <a:p>
+            <a:r>
+              <a:rPr lang="en-US" dirty="0"/>
+              <a:t>ETL</a:t>
+            </a:r>
+          </a:p>
+        </p:txBody>
+      </p:sp>
+      <p:sp>
+        <p:nvSpPr>
+          <p:cNvPr id="3" name="Content Placeholder 2">
+            <a:extLst>
+              <a:ext uri="{FF2B5EF4-FFF2-40B4-BE49-F238E27FC236}">
+                <a16:creationId xmlns:a16="http://schemas.microsoft.com/office/drawing/2014/main" id="{309A41C7-778B-4421-AACD-55BF149C098F}"/>
+              </a:ext>
+            </a:extLst>
+          </p:cNvPr>
+          <p:cNvSpPr>
+            <a:spLocks noGrp="1"/>
+          </p:cNvSpPr>
+          <p:nvPr>
+            <p:ph idx="1"/>
+          </p:nvPr>
+        </p:nvSpPr>
+        <p:spPr/>
+        <p:txBody>
+          <a:bodyPr>
+            <a:normAutofit/>
+          </a:bodyPr>
+          <a:lstStyle/>
+          <a:p>
+            <a:r>
+              <a:rPr lang="en-US" dirty="0"/>
+              <a:t>Structure of stored procedure handling transformation from staging to DWH layer.</a:t>
+            </a:r>
+          </a:p>
+          <a:p>
+            <a:r>
+              <a:rPr lang="en-US" dirty="0"/>
+              <a:t>If </a:t>
+            </a:r>
+            <a:r>
+              <a:rPr lang="en-US" dirty="0" err="1"/>
+              <a:t>tSQL</a:t>
+            </a:r>
+            <a:r>
+              <a:rPr lang="en-US" dirty="0"/>
+              <a:t> cannot handle some business rules, possibility to go back to python, pull data, transform then insert</a:t>
+            </a:r>
+          </a:p>
+          <a:p>
+            <a:pPr lvl="1"/>
+            <a:r>
+              <a:rPr lang="en-US" dirty="0"/>
+              <a:t>Spreads jobs, which is not ideal for maintenance</a:t>
+            </a:r>
+          </a:p>
+          <a:p>
+            <a:r>
+              <a:rPr lang="en-US" dirty="0"/>
+              <a:t>Drop and reload </a:t>
+            </a:r>
+            <a:r>
+              <a:rPr lang="en-US" dirty="0" err="1"/>
+              <a:t>factTables</a:t>
+            </a:r>
+            <a:r>
+              <a:rPr lang="en-US" dirty="0"/>
+              <a:t>, supports change of table structure easily while </a:t>
+            </a:r>
+            <a:r>
+              <a:rPr lang="en-US" dirty="0" err="1"/>
+              <a:t>devlopping</a:t>
+            </a:r>
+            <a:r>
+              <a:rPr lang="en-US" dirty="0"/>
+              <a:t> and first phase of acceptance.</a:t>
+            </a:r>
+          </a:p>
+          <a:p>
+            <a:pPr lvl="1"/>
+            <a:r>
+              <a:rPr lang="en-US" dirty="0"/>
+              <a:t>Change to incremental load in the future, not timestamp to rely on for metadata though.</a:t>
+            </a:r>
+          </a:p>
+        </p:txBody>
+      </p:sp>
+    </p:spTree>
+    <p:extLst>
+      <p:ext uri="{BB962C8B-B14F-4D97-AF65-F5344CB8AC3E}">
+        <p14:creationId xmlns:p14="http://schemas.microsoft.com/office/powerpoint/2010/main" val="2905167491"/>
+      </p:ext>
+    </p:extLst>
+  </p:cSld>
+  <p:clrMapOvr>
+    <a:masterClrMapping/>
+  </p:clrMapOvr>
+</p:sld>
+</file>
+
+<file path=ppt/slides/slide4.xml><?xml version="1.0" encoding="utf-8"?>
+<p:sld xmlns:a="http://schemas.openxmlformats.org/drawingml/2006/main" xmlns:r="http://schemas.openxmlformats.org/officeDocument/2006/relationships" xmlns:p="http://schemas.openxmlformats.org/presentationml/2006/main">
+  <p:cSld>
+    <p:spTree>
+      <p:nvGrpSpPr>
+        <p:cNvPr id="1" name=""/>
+        <p:cNvGrpSpPr/>
+        <p:nvPr/>
+      </p:nvGrpSpPr>
+      <p:grpSpPr>
+        <a:xfrm>
+          <a:off x="0" y="0"/>
+          <a:ext cx="0" cy="0"/>
+          <a:chOff x="0" y="0"/>
+          <a:chExt cx="0" cy="0"/>
+        </a:xfrm>
+      </p:grpSpPr>
+      <p:sp>
+        <p:nvSpPr>
+          <p:cNvPr id="2" name="Title 1">
+            <a:extLst>
+              <a:ext uri="{FF2B5EF4-FFF2-40B4-BE49-F238E27FC236}">
+                <a16:creationId xmlns:a16="http://schemas.microsoft.com/office/drawing/2014/main" id="{2AA9AFC1-76F9-4B13-B5C5-C14195A576EE}"/>
+              </a:ext>
+            </a:extLst>
+          </p:cNvPr>
+          <p:cNvSpPr>
+            <a:spLocks noGrp="1"/>
+          </p:cNvSpPr>
+          <p:nvPr>
+            <p:ph type="title"/>
+          </p:nvPr>
+        </p:nvSpPr>
+        <p:spPr/>
+        <p:txBody>
+          <a:bodyPr/>
+          <a:lstStyle/>
+          <a:p>
+            <a:r>
+              <a:rPr lang="en-US" dirty="0"/>
+              <a:t>Orchestration </a:t>
+            </a:r>
+          </a:p>
+        </p:txBody>
+      </p:sp>
+      <p:sp>
+        <p:nvSpPr>
+          <p:cNvPr id="3" name="Content Placeholder 2">
+            <a:extLst>
+              <a:ext uri="{FF2B5EF4-FFF2-40B4-BE49-F238E27FC236}">
+                <a16:creationId xmlns:a16="http://schemas.microsoft.com/office/drawing/2014/main" id="{3E25AAC5-6E26-4416-81C1-56D256B0AFC1}"/>
+              </a:ext>
+            </a:extLst>
+          </p:cNvPr>
+          <p:cNvSpPr>
+            <a:spLocks noGrp="1"/>
+          </p:cNvSpPr>
+          <p:nvPr>
+            <p:ph idx="1"/>
+          </p:nvPr>
+        </p:nvSpPr>
+        <p:spPr>
+          <a:xfrm>
+            <a:off x="838200" y="1825625"/>
+            <a:ext cx="6036129" cy="4351338"/>
+          </a:xfrm>
+        </p:spPr>
+        <p:txBody>
+          <a:bodyPr/>
+          <a:lstStyle/>
+          <a:p>
+            <a:r>
+              <a:rPr lang="en-US" dirty="0"/>
+              <a:t>All flows in stored procedure</a:t>
+            </a:r>
+          </a:p>
+          <a:p>
+            <a:pPr lvl="1"/>
+            <a:r>
+              <a:rPr lang="en-US" dirty="0"/>
+              <a:t>Ease of modification</a:t>
+            </a:r>
+          </a:p>
+          <a:p>
+            <a:pPr lvl="1"/>
+            <a:r>
+              <a:rPr lang="en-US" dirty="0"/>
+              <a:t>Possibility to keep repository of all </a:t>
+            </a:r>
+            <a:r>
+              <a:rPr lang="en-US" dirty="0" err="1"/>
+              <a:t>usps</a:t>
+            </a:r>
+            <a:endParaRPr lang="en-US" dirty="0"/>
+          </a:p>
+          <a:p>
+            <a:r>
+              <a:rPr lang="en-US" dirty="0"/>
+              <a:t>Orchestration through SQL server Agent and jobs</a:t>
+            </a:r>
+          </a:p>
+          <a:p>
+            <a:pPr lvl="1"/>
+            <a:r>
+              <a:rPr lang="en-US" dirty="0"/>
+              <a:t>Possible to call multiple stored procedures that would call extra stored procedures (</a:t>
+            </a:r>
+            <a:r>
+              <a:rPr lang="en-US" dirty="0" err="1"/>
+              <a:t>eg</a:t>
+            </a:r>
+            <a:r>
+              <a:rPr lang="en-US" dirty="0"/>
+              <a:t> </a:t>
+            </a:r>
+            <a:r>
+              <a:rPr lang="en-US" dirty="0" err="1"/>
+              <a:t>usp_merge_staging</a:t>
+            </a:r>
+            <a:r>
+              <a:rPr lang="en-US" dirty="0"/>
+              <a:t>).</a:t>
+            </a:r>
+          </a:p>
+          <a:p>
+            <a:pPr lvl="1"/>
+            <a:r>
+              <a:rPr lang="en-US" dirty="0"/>
+              <a:t>Bit more obscure than SSIS, but less maintenance heavy. As long as we are on the same server it should not be an issue.</a:t>
+            </a:r>
+          </a:p>
+        </p:txBody>
+      </p:sp>
+      <p:pic>
+        <p:nvPicPr>
+          <p:cNvPr id="5" name="Picture 4">
+            <a:extLst>
+              <a:ext uri="{FF2B5EF4-FFF2-40B4-BE49-F238E27FC236}">
+                <a16:creationId xmlns:a16="http://schemas.microsoft.com/office/drawing/2014/main" id="{33D0815D-0DD1-40F0-9503-360CFC03C81E}"/>
+              </a:ext>
+            </a:extLst>
+          </p:cNvPr>
+          <p:cNvPicPr>
+            <a:picLocks noChangeAspect="1"/>
+          </p:cNvPicPr>
+          <p:nvPr/>
+        </p:nvPicPr>
+        <p:blipFill>
+          <a:blip r:embed="rId2"/>
+          <a:stretch>
+            <a:fillRect/>
+          </a:stretch>
+        </p:blipFill>
+        <p:spPr>
+          <a:xfrm>
+            <a:off x="7247526" y="2064711"/>
+            <a:ext cx="4563112" cy="2467319"/>
+          </a:xfrm>
+          <a:prstGeom prst="rect">
+            <a:avLst/>
+          </a:prstGeom>
+        </p:spPr>
+      </p:pic>
+    </p:spTree>
+    <p:extLst>
+      <p:ext uri="{BB962C8B-B14F-4D97-AF65-F5344CB8AC3E}">
+        <p14:creationId xmlns:p14="http://schemas.microsoft.com/office/powerpoint/2010/main" val="1195254829"/>
+      </p:ext>
+    </p:extLst>
+  </p:cSld>
+  <p:clrMapOvr>
+    <a:masterClrMapping/>
+  </p:clrMapOvr>
+</p:sld>
+</file>
+
+<file path=ppt/slides/slide5.xml><?xml version="1.0" encoding="utf-8"?>
+<p:sld xmlns:a="http://schemas.openxmlformats.org/drawingml/2006/main" xmlns:r="http://schemas.openxmlformats.org/officeDocument/2006/relationships" xmlns:p="http://schemas.openxmlformats.org/presentationml/2006/main">
+  <p:cSld>
+    <p:spTree>
+      <p:nvGrpSpPr>
+        <p:cNvPr id="1" name=""/>
+        <p:cNvGrpSpPr/>
+        <p:nvPr/>
+      </p:nvGrpSpPr>
+      <p:grpSpPr>
+        <a:xfrm>
+          <a:off x="0" y="0"/>
+          <a:ext cx="0" cy="0"/>
+          <a:chOff x="0" y="0"/>
+          <a:chExt cx="0" cy="0"/>
+        </a:xfrm>
+      </p:grpSpPr>
+      <p:sp>
+        <p:nvSpPr>
+          <p:cNvPr id="2" name="Title 1">
+            <a:extLst>
+              <a:ext uri="{FF2B5EF4-FFF2-40B4-BE49-F238E27FC236}">
+                <a16:creationId xmlns:a16="http://schemas.microsoft.com/office/drawing/2014/main" id="{672ECE5C-1517-4F42-9343-45AA8C684D15}"/>
+              </a:ext>
+            </a:extLst>
+          </p:cNvPr>
+          <p:cNvSpPr>
+            <a:spLocks noGrp="1"/>
+          </p:cNvSpPr>
+          <p:nvPr>
+            <p:ph type="title"/>
+          </p:nvPr>
+        </p:nvSpPr>
+        <p:spPr/>
+        <p:txBody>
+          <a:bodyPr/>
+          <a:lstStyle/>
+          <a:p>
+            <a:r>
+              <a:rPr lang="en-US" dirty="0"/>
+              <a:t>Final Model</a:t>
+            </a:r>
+          </a:p>
+        </p:txBody>
+      </p:sp>
       <p:sp>
         <p:nvSpPr>
           <p:cNvPr id="6" name="TextBox 5">
@@ -3393,8 +4041,8 @@
         </p:nvSpPr>
         <p:spPr>
           <a:xfrm>
-            <a:off x="4627417" y="1417782"/>
-            <a:ext cx="5504873" cy="4801314"/>
+            <a:off x="4704978" y="866693"/>
+            <a:ext cx="5504873" cy="6463308"/>
           </a:xfrm>
           <a:prstGeom prst="rect">
             <a:avLst/>
@@ -3413,12 +4061,54 @@
             </a:pPr>
             <a:r>
               <a:rPr lang="en-US" b="1" dirty="0" err="1"/>
+              <a:t>dimSalesRank</a:t>
+            </a:r>
+            <a:r>
+              <a:rPr lang="en-US" dirty="0"/>
+              <a:t>: coming from </a:t>
+            </a:r>
+            <a:r>
+              <a:rPr lang="en-US" dirty="0" err="1"/>
+              <a:t>salesrank</a:t>
+            </a:r>
+            <a:r>
+              <a:rPr lang="en-US" dirty="0"/>
+              <a:t> field from source.</a:t>
+            </a:r>
+          </a:p>
+          <a:p>
+            <a:pPr marL="285750" indent="-285750">
+              <a:buFont typeface="Arial" panose="020B0604020202020204" pitchFamily="34" charset="0"/>
+              <a:buChar char="•"/>
+            </a:pPr>
+            <a:endParaRPr lang="en-US" b="1" dirty="0"/>
+          </a:p>
+          <a:p>
+            <a:pPr marL="285750" indent="-285750">
+              <a:buFont typeface="Arial" panose="020B0604020202020204" pitchFamily="34" charset="0"/>
+              <a:buChar char="•"/>
+            </a:pPr>
+            <a:r>
+              <a:rPr lang="en-US" b="1" dirty="0" err="1"/>
+              <a:t>dimProductMetadata</a:t>
+            </a:r>
+            <a:r>
+              <a:rPr lang="en-US" dirty="0"/>
+              <a:t>:</a:t>
+            </a:r>
+            <a:r>
+              <a:rPr lang="en-US" b="1" dirty="0"/>
+              <a:t> </a:t>
+            </a:r>
+            <a:r>
+              <a:rPr lang="en-US" dirty="0"/>
+              <a:t>all flat fields from source, plus a price key for </a:t>
+            </a:r>
+            <a:r>
+              <a:rPr lang="en-US" dirty="0" err="1"/>
               <a:t>dimPriceRange</a:t>
             </a:r>
-            <a:r>
-              <a:rPr lang="en-US" dirty="0"/>
-              <a:t>: Holds buckets for price. Key generated by passing price through log function. Prevents having to join/lookup.</a:t>
-            </a:r>
+            <a:endParaRPr lang="en-US" dirty="0"/>
           </a:p>
           <a:p>
             <a:pPr marL="285750" indent="-285750">
@@ -3442,6 +4132,23 @@
             </a:r>
           </a:p>
           <a:p>
+            <a:endParaRPr lang="en-US" b="1" dirty="0"/>
+          </a:p>
+          <a:p>
+            <a:pPr marL="285750" indent="-285750">
+              <a:buFont typeface="Arial" panose="020B0604020202020204" pitchFamily="34" charset="0"/>
+              <a:buChar char="•"/>
+            </a:pPr>
+            <a:r>
+              <a:rPr lang="en-US" b="1" dirty="0" err="1"/>
+              <a:t>dimPriceRange</a:t>
+            </a:r>
+            <a:r>
+              <a:rPr lang="en-US" dirty="0"/>
+              <a:t>: Holds buckets for price. Key generated by passing price through log function. Prevents having to join/lookup.</a:t>
+            </a:r>
+          </a:p>
+          <a:p>
             <a:pPr marL="285750" indent="-285750">
               <a:buFont typeface="Arial" panose="020B0604020202020204" pitchFamily="34" charset="0"/>
               <a:buChar char="•"/>
@@ -3455,19 +4162,19 @@
             </a:pPr>
             <a:r>
               <a:rPr lang="en-US" b="1" dirty="0" err="1"/>
-              <a:t>dimSalesRank</a:t>
-            </a:r>
-            <a:r>
-              <a:rPr lang="en-US" dirty="0"/>
-              <a:t>: coming from </a:t>
+              <a:t>dimProductPrice</a:t>
+            </a:r>
+            <a:r>
+              <a:rPr lang="en-US" dirty="0"/>
+              <a:t>: SCD Type 2, holding the price of any item, changing through time. Had to create a separate </a:t>
             </a:r>
             <a:r>
               <a:rPr lang="en-US" dirty="0" err="1"/>
-              <a:t>salesrank</a:t>
-            </a:r>
-            <a:r>
-              <a:rPr lang="en-US" dirty="0"/>
-              <a:t> field from source.</a:t>
+              <a:t>product_key</a:t>
+            </a:r>
+            <a:r>
+              <a:rPr lang="en-US" dirty="0"/>
+              <a:t> for that.</a:t>
             </a:r>
           </a:p>
           <a:p>
@@ -3484,52 +4191,411 @@
             </a:pPr>
             <a:r>
               <a:rPr lang="en-US" b="1" dirty="0" err="1"/>
-              <a:t>dimProductMetadata</a:t>
-            </a:r>
-            <a:r>
-              <a:rPr lang="en-US" dirty="0"/>
-              <a:t>:</a:t>
-            </a:r>
-            <a:r>
-              <a:rPr lang="en-US" b="1" dirty="0"/>
-              <a:t> </a:t>
-            </a:r>
-            <a:r>
-              <a:rPr lang="en-US" dirty="0"/>
-              <a:t>all flat fields from source, plus a price key for </a:t>
-            </a:r>
-            <a:r>
-              <a:rPr lang="en-US" dirty="0" err="1"/>
-              <a:t>dimPriceRange</a:t>
-            </a:r>
-            <a:endParaRPr lang="en-US" dirty="0"/>
-          </a:p>
-          <a:p>
-            <a:endParaRPr lang="en-US" dirty="0"/>
-          </a:p>
-          <a:p>
-            <a:endParaRPr lang="en-US" dirty="0"/>
+              <a:t>factReviews</a:t>
+            </a:r>
+            <a:r>
+              <a:rPr lang="en-US" dirty="0"/>
+              <a:t>: holds the review data minus the text, since there is no value in bringing that over for now</a:t>
+            </a:r>
           </a:p>
           <a:p>
             <a:pPr marL="285750" indent="-285750">
               <a:buFont typeface="Arial" panose="020B0604020202020204" pitchFamily="34" charset="0"/>
               <a:buChar char="•"/>
             </a:pPr>
-            <a:r>
-              <a:rPr lang="en-US" dirty="0" err="1"/>
-              <a:t>factReviews</a:t>
-            </a:r>
-            <a:r>
-              <a:rPr lang="en-US" dirty="0"/>
-              <a:t>: holds the review data minus the text, since there is no value in bringing that over for now</a:t>
-            </a:r>
-          </a:p>
-        </p:txBody>
-      </p:sp>
+            <a:endParaRPr lang="en-US" dirty="0"/>
+          </a:p>
+          <a:p>
+            <a:pPr marL="285750" indent="-285750">
+              <a:buFont typeface="Arial" panose="020B0604020202020204" pitchFamily="34" charset="0"/>
+              <a:buChar char="•"/>
+            </a:pPr>
+            <a:endParaRPr lang="en-US" dirty="0"/>
+          </a:p>
+          <a:p>
+            <a:pPr marL="285750" indent="-285750">
+              <a:buFont typeface="Arial" panose="020B0604020202020204" pitchFamily="34" charset="0"/>
+              <a:buChar char="•"/>
+            </a:pPr>
+            <a:endParaRPr lang="en-US" dirty="0"/>
+          </a:p>
+        </p:txBody>
+      </p:sp>
+      <p:pic>
+        <p:nvPicPr>
+          <p:cNvPr id="4" name="Picture 3">
+            <a:extLst>
+              <a:ext uri="{FF2B5EF4-FFF2-40B4-BE49-F238E27FC236}">
+                <a16:creationId xmlns:a16="http://schemas.microsoft.com/office/drawing/2014/main" id="{0FB962A6-3096-49BD-A551-155CEBB09614}"/>
+              </a:ext>
+            </a:extLst>
+          </p:cNvPr>
+          <p:cNvPicPr>
+            <a:picLocks noChangeAspect="1"/>
+          </p:cNvPicPr>
+          <p:nvPr/>
+        </p:nvPicPr>
+        <p:blipFill>
+          <a:blip r:embed="rId2"/>
+          <a:stretch>
+            <a:fillRect/>
+          </a:stretch>
+        </p:blipFill>
+        <p:spPr>
+          <a:xfrm>
+            <a:off x="188863" y="1579418"/>
+            <a:ext cx="4206617" cy="4216400"/>
+          </a:xfrm>
+          <a:prstGeom prst="rect">
+            <a:avLst/>
+          </a:prstGeom>
+        </p:spPr>
+      </p:pic>
     </p:spTree>
     <p:extLst>
       <p:ext uri="{BB962C8B-B14F-4D97-AF65-F5344CB8AC3E}">
         <p14:creationId xmlns:p14="http://schemas.microsoft.com/office/powerpoint/2010/main" val="1244734200"/>
+      </p:ext>
+    </p:extLst>
+  </p:cSld>
+  <p:clrMapOvr>
+    <a:masterClrMapping/>
+  </p:clrMapOvr>
+</p:sld>
+</file>
+
+<file path=ppt/slides/slide6.xml><?xml version="1.0" encoding="utf-8"?>
+<p:sld xmlns:a="http://schemas.openxmlformats.org/drawingml/2006/main" xmlns:r="http://schemas.openxmlformats.org/officeDocument/2006/relationships" xmlns:p="http://schemas.openxmlformats.org/presentationml/2006/main">
+  <p:cSld>
+    <p:spTree>
+      <p:nvGrpSpPr>
+        <p:cNvPr id="1" name=""/>
+        <p:cNvGrpSpPr/>
+        <p:nvPr/>
+      </p:nvGrpSpPr>
+      <p:grpSpPr>
+        <a:xfrm>
+          <a:off x="0" y="0"/>
+          <a:ext cx="0" cy="0"/>
+          <a:chOff x="0" y="0"/>
+          <a:chExt cx="0" cy="0"/>
+        </a:xfrm>
+      </p:grpSpPr>
+      <p:sp>
+        <p:nvSpPr>
+          <p:cNvPr id="2" name="Title 1">
+            <a:extLst>
+              <a:ext uri="{FF2B5EF4-FFF2-40B4-BE49-F238E27FC236}">
+                <a16:creationId xmlns:a16="http://schemas.microsoft.com/office/drawing/2014/main" id="{B8EFEC72-D9E8-4020-8A86-E46635C7394A}"/>
+              </a:ext>
+            </a:extLst>
+          </p:cNvPr>
+          <p:cNvSpPr>
+            <a:spLocks noGrp="1"/>
+          </p:cNvSpPr>
+          <p:nvPr>
+            <p:ph type="title"/>
+          </p:nvPr>
+        </p:nvSpPr>
+        <p:spPr/>
+        <p:txBody>
+          <a:bodyPr/>
+          <a:lstStyle/>
+          <a:p>
+            <a:r>
+              <a:rPr lang="en-US" dirty="0"/>
+              <a:t>Visual examples</a:t>
+            </a:r>
+          </a:p>
+        </p:txBody>
+      </p:sp>
+      <p:pic>
+        <p:nvPicPr>
+          <p:cNvPr id="5" name="Picture 4">
+            <a:extLst>
+              <a:ext uri="{FF2B5EF4-FFF2-40B4-BE49-F238E27FC236}">
+                <a16:creationId xmlns:a16="http://schemas.microsoft.com/office/drawing/2014/main" id="{84C98A9C-2926-4E0B-B024-E9DA32941E86}"/>
+              </a:ext>
+            </a:extLst>
+          </p:cNvPr>
+          <p:cNvPicPr>
+            <a:picLocks noChangeAspect="1"/>
+          </p:cNvPicPr>
+          <p:nvPr/>
+        </p:nvPicPr>
+        <p:blipFill>
+          <a:blip r:embed="rId2"/>
+          <a:stretch>
+            <a:fillRect/>
+          </a:stretch>
+        </p:blipFill>
+        <p:spPr>
+          <a:xfrm>
+            <a:off x="2613891" y="2005141"/>
+            <a:ext cx="7488681" cy="4220168"/>
+          </a:xfrm>
+          <a:prstGeom prst="rect">
+            <a:avLst/>
+          </a:prstGeom>
+        </p:spPr>
+      </p:pic>
+    </p:spTree>
+    <p:extLst>
+      <p:ext uri="{BB962C8B-B14F-4D97-AF65-F5344CB8AC3E}">
+        <p14:creationId xmlns:p14="http://schemas.microsoft.com/office/powerpoint/2010/main" val="1650623897"/>
+      </p:ext>
+    </p:extLst>
+  </p:cSld>
+  <p:clrMapOvr>
+    <a:masterClrMapping/>
+  </p:clrMapOvr>
+</p:sld>
+</file>
+
+<file path=ppt/slides/slide7.xml><?xml version="1.0" encoding="utf-8"?>
+<p:sld xmlns:a="http://schemas.openxmlformats.org/drawingml/2006/main" xmlns:r="http://schemas.openxmlformats.org/officeDocument/2006/relationships" xmlns:p="http://schemas.openxmlformats.org/presentationml/2006/main">
+  <p:cSld>
+    <p:spTree>
+      <p:nvGrpSpPr>
+        <p:cNvPr id="1" name=""/>
+        <p:cNvGrpSpPr/>
+        <p:nvPr/>
+      </p:nvGrpSpPr>
+      <p:grpSpPr>
+        <a:xfrm>
+          <a:off x="0" y="0"/>
+          <a:ext cx="0" cy="0"/>
+          <a:chOff x="0" y="0"/>
+          <a:chExt cx="0" cy="0"/>
+        </a:xfrm>
+      </p:grpSpPr>
+      <p:sp>
+        <p:nvSpPr>
+          <p:cNvPr id="2" name="Title 1">
+            <a:extLst>
+              <a:ext uri="{FF2B5EF4-FFF2-40B4-BE49-F238E27FC236}">
+                <a16:creationId xmlns:a16="http://schemas.microsoft.com/office/drawing/2014/main" id="{202557A9-3449-42ED-932F-736235595758}"/>
+              </a:ext>
+            </a:extLst>
+          </p:cNvPr>
+          <p:cNvSpPr>
+            <a:spLocks noGrp="1"/>
+          </p:cNvSpPr>
+          <p:nvPr>
+            <p:ph type="title"/>
+          </p:nvPr>
+        </p:nvSpPr>
+        <p:spPr/>
+        <p:txBody>
+          <a:bodyPr/>
+          <a:lstStyle/>
+          <a:p>
+            <a:r>
+              <a:rPr lang="en-US" dirty="0" err="1"/>
+              <a:t>Also_bought</a:t>
+            </a:r>
+            <a:r>
+              <a:rPr lang="en-US" dirty="0"/>
+              <a:t> / </a:t>
+            </a:r>
+            <a:r>
+              <a:rPr lang="en-US" dirty="0" err="1"/>
+              <a:t>also_viewed</a:t>
+            </a:r>
+            <a:endParaRPr lang="en-US" dirty="0"/>
+          </a:p>
+        </p:txBody>
+      </p:sp>
+      <p:sp>
+        <p:nvSpPr>
+          <p:cNvPr id="3" name="Content Placeholder 2">
+            <a:extLst>
+              <a:ext uri="{FF2B5EF4-FFF2-40B4-BE49-F238E27FC236}">
+                <a16:creationId xmlns:a16="http://schemas.microsoft.com/office/drawing/2014/main" id="{161B5CA0-C96B-4EB4-A3A8-E73D425B62A7}"/>
+              </a:ext>
+            </a:extLst>
+          </p:cNvPr>
+          <p:cNvSpPr>
+            <a:spLocks noGrp="1"/>
+          </p:cNvSpPr>
+          <p:nvPr>
+            <p:ph idx="1"/>
+          </p:nvPr>
+        </p:nvSpPr>
+        <p:spPr/>
+        <p:txBody>
+          <a:bodyPr/>
+          <a:lstStyle/>
+          <a:p>
+            <a:r>
+              <a:rPr lang="en-US" dirty="0" err="1"/>
+              <a:t>Kinda</a:t>
+            </a:r>
+            <a:r>
+              <a:rPr lang="en-US" dirty="0"/>
+              <a:t> confused about that one, did not import related to dimensional model, as seemed un-necessary. Can run the following query:</a:t>
+            </a:r>
+          </a:p>
+        </p:txBody>
+      </p:sp>
+      <p:pic>
+        <p:nvPicPr>
+          <p:cNvPr id="5" name="Picture 4">
+            <a:extLst>
+              <a:ext uri="{FF2B5EF4-FFF2-40B4-BE49-F238E27FC236}">
+                <a16:creationId xmlns:a16="http://schemas.microsoft.com/office/drawing/2014/main" id="{890C147C-89CC-4663-AC66-D1FC15124484}"/>
+              </a:ext>
+            </a:extLst>
+          </p:cNvPr>
+          <p:cNvPicPr>
+            <a:picLocks noChangeAspect="1"/>
+          </p:cNvPicPr>
+          <p:nvPr/>
+        </p:nvPicPr>
+        <p:blipFill>
+          <a:blip r:embed="rId2"/>
+          <a:stretch>
+            <a:fillRect/>
+          </a:stretch>
+        </p:blipFill>
+        <p:spPr>
+          <a:xfrm>
+            <a:off x="4001224" y="3120477"/>
+            <a:ext cx="3515216" cy="2829320"/>
+          </a:xfrm>
+          <a:prstGeom prst="rect">
+            <a:avLst/>
+          </a:prstGeom>
+        </p:spPr>
+      </p:pic>
+    </p:spTree>
+    <p:extLst>
+      <p:ext uri="{BB962C8B-B14F-4D97-AF65-F5344CB8AC3E}">
+        <p14:creationId xmlns:p14="http://schemas.microsoft.com/office/powerpoint/2010/main" val="4292928952"/>
+      </p:ext>
+    </p:extLst>
+  </p:cSld>
+  <p:clrMapOvr>
+    <a:masterClrMapping/>
+  </p:clrMapOvr>
+</p:sld>
+</file>
+
+<file path=ppt/slides/slide8.xml><?xml version="1.0" encoding="utf-8"?>
+<p:sld xmlns:a="http://schemas.openxmlformats.org/drawingml/2006/main" xmlns:r="http://schemas.openxmlformats.org/officeDocument/2006/relationships" xmlns:p="http://schemas.openxmlformats.org/presentationml/2006/main">
+  <p:cSld>
+    <p:spTree>
+      <p:nvGrpSpPr>
+        <p:cNvPr id="1" name=""/>
+        <p:cNvGrpSpPr/>
+        <p:nvPr/>
+      </p:nvGrpSpPr>
+      <p:grpSpPr>
+        <a:xfrm>
+          <a:off x="0" y="0"/>
+          <a:ext cx="0" cy="0"/>
+          <a:chOff x="0" y="0"/>
+          <a:chExt cx="0" cy="0"/>
+        </a:xfrm>
+      </p:grpSpPr>
+      <p:sp>
+        <p:nvSpPr>
+          <p:cNvPr id="2" name="Title 1">
+            <a:extLst>
+              <a:ext uri="{FF2B5EF4-FFF2-40B4-BE49-F238E27FC236}">
+                <a16:creationId xmlns:a16="http://schemas.microsoft.com/office/drawing/2014/main" id="{C28438DF-AC40-43CF-B81E-95C65F2CFA26}"/>
+              </a:ext>
+            </a:extLst>
+          </p:cNvPr>
+          <p:cNvSpPr>
+            <a:spLocks noGrp="1"/>
+          </p:cNvSpPr>
+          <p:nvPr>
+            <p:ph type="title"/>
+          </p:nvPr>
+        </p:nvSpPr>
+        <p:spPr/>
+        <p:txBody>
+          <a:bodyPr/>
+          <a:lstStyle/>
+          <a:p>
+            <a:r>
+              <a:rPr lang="en-US" dirty="0"/>
+              <a:t>Optimizations</a:t>
+            </a:r>
+          </a:p>
+        </p:txBody>
+      </p:sp>
+      <p:sp>
+        <p:nvSpPr>
+          <p:cNvPr id="3" name="Content Placeholder 2">
+            <a:extLst>
+              <a:ext uri="{FF2B5EF4-FFF2-40B4-BE49-F238E27FC236}">
+                <a16:creationId xmlns:a16="http://schemas.microsoft.com/office/drawing/2014/main" id="{8CC1BF6A-D07D-4C0F-8BBD-D271C66DF47E}"/>
+              </a:ext>
+            </a:extLst>
+          </p:cNvPr>
+          <p:cNvSpPr>
+            <a:spLocks noGrp="1"/>
+          </p:cNvSpPr>
+          <p:nvPr>
+            <p:ph idx="1"/>
+          </p:nvPr>
+        </p:nvSpPr>
+        <p:spPr/>
+        <p:txBody>
+          <a:bodyPr/>
+          <a:lstStyle/>
+          <a:p>
+            <a:r>
+              <a:rPr lang="en-US" dirty="0"/>
+              <a:t>Use any kind of distributed computing (</a:t>
+            </a:r>
+            <a:r>
+              <a:rPr lang="en-US" dirty="0" err="1"/>
+              <a:t>pyspark</a:t>
+            </a:r>
+            <a:r>
+              <a:rPr lang="en-US" dirty="0"/>
+              <a:t>?). Currently built on premise, limited by hardware, will be hard to handle high volume.</a:t>
+            </a:r>
+          </a:p>
+          <a:p>
+            <a:r>
+              <a:rPr lang="en-US" dirty="0"/>
+              <a:t>Streaming data set for ingestion if access to something better than a flat file?</a:t>
+            </a:r>
+          </a:p>
+          <a:p>
+            <a:r>
+              <a:rPr lang="en-US" dirty="0"/>
+              <a:t>Right now, no index created, can look into that.</a:t>
+            </a:r>
+          </a:p>
+          <a:p>
+            <a:r>
+              <a:rPr lang="en-US" dirty="0"/>
+              <a:t>Working with sample data, might be worth looking into some of the merge queries</a:t>
+            </a:r>
+          </a:p>
+          <a:p>
+            <a:r>
+              <a:rPr lang="en-US" dirty="0"/>
+              <a:t>Working on finding a better source than a compressed flat file</a:t>
+            </a:r>
+          </a:p>
+          <a:p>
+            <a:endParaRPr lang="en-US" dirty="0"/>
+          </a:p>
+          <a:p>
+            <a:endParaRPr lang="en-US" dirty="0"/>
+          </a:p>
+        </p:txBody>
+      </p:sp>
+    </p:spTree>
+    <p:extLst>
+      <p:ext uri="{BB962C8B-B14F-4D97-AF65-F5344CB8AC3E}">
+        <p14:creationId xmlns:p14="http://schemas.microsoft.com/office/powerpoint/2010/main" val="1643817796"/>
       </p:ext>
     </p:extLst>
   </p:cSld>

</xml_diff>

<commit_message>
Added dimDate to model
</commit_message>
<xml_diff>
--- a/Presentation.pptx
+++ b/Presentation.pptx
@@ -266,7 +266,7 @@
           <a:p>
             <a:fld id="{AC5FDBF2-827B-41F1-ABE5-AC1D821AC5D9}" type="datetimeFigureOut">
               <a:rPr lang="en-US" smtClean="0"/>
-              <a:t>5/15/2021</a:t>
+              <a:t>5/17/2021</a:t>
             </a:fld>
             <a:endParaRPr lang="en-US"/>
           </a:p>
@@ -464,7 +464,7 @@
           <a:p>
             <a:fld id="{AC5FDBF2-827B-41F1-ABE5-AC1D821AC5D9}" type="datetimeFigureOut">
               <a:rPr lang="en-US" smtClean="0"/>
-              <a:t>5/15/2021</a:t>
+              <a:t>5/17/2021</a:t>
             </a:fld>
             <a:endParaRPr lang="en-US"/>
           </a:p>
@@ -672,7 +672,7 @@
           <a:p>
             <a:fld id="{AC5FDBF2-827B-41F1-ABE5-AC1D821AC5D9}" type="datetimeFigureOut">
               <a:rPr lang="en-US" smtClean="0"/>
-              <a:t>5/15/2021</a:t>
+              <a:t>5/17/2021</a:t>
             </a:fld>
             <a:endParaRPr lang="en-US"/>
           </a:p>
@@ -870,7 +870,7 @@
           <a:p>
             <a:fld id="{AC5FDBF2-827B-41F1-ABE5-AC1D821AC5D9}" type="datetimeFigureOut">
               <a:rPr lang="en-US" smtClean="0"/>
-              <a:t>5/15/2021</a:t>
+              <a:t>5/17/2021</a:t>
             </a:fld>
             <a:endParaRPr lang="en-US"/>
           </a:p>
@@ -1145,7 +1145,7 @@
           <a:p>
             <a:fld id="{AC5FDBF2-827B-41F1-ABE5-AC1D821AC5D9}" type="datetimeFigureOut">
               <a:rPr lang="en-US" smtClean="0"/>
-              <a:t>5/15/2021</a:t>
+              <a:t>5/17/2021</a:t>
             </a:fld>
             <a:endParaRPr lang="en-US"/>
           </a:p>
@@ -1410,7 +1410,7 @@
           <a:p>
             <a:fld id="{AC5FDBF2-827B-41F1-ABE5-AC1D821AC5D9}" type="datetimeFigureOut">
               <a:rPr lang="en-US" smtClean="0"/>
-              <a:t>5/15/2021</a:t>
+              <a:t>5/17/2021</a:t>
             </a:fld>
             <a:endParaRPr lang="en-US"/>
           </a:p>
@@ -1822,7 +1822,7 @@
           <a:p>
             <a:fld id="{AC5FDBF2-827B-41F1-ABE5-AC1D821AC5D9}" type="datetimeFigureOut">
               <a:rPr lang="en-US" smtClean="0"/>
-              <a:t>5/15/2021</a:t>
+              <a:t>5/17/2021</a:t>
             </a:fld>
             <a:endParaRPr lang="en-US"/>
           </a:p>
@@ -1963,7 +1963,7 @@
           <a:p>
             <a:fld id="{AC5FDBF2-827B-41F1-ABE5-AC1D821AC5D9}" type="datetimeFigureOut">
               <a:rPr lang="en-US" smtClean="0"/>
-              <a:t>5/15/2021</a:t>
+              <a:t>5/17/2021</a:t>
             </a:fld>
             <a:endParaRPr lang="en-US"/>
           </a:p>
@@ -2076,7 +2076,7 @@
           <a:p>
             <a:fld id="{AC5FDBF2-827B-41F1-ABE5-AC1D821AC5D9}" type="datetimeFigureOut">
               <a:rPr lang="en-US" smtClean="0"/>
-              <a:t>5/15/2021</a:t>
+              <a:t>5/17/2021</a:t>
             </a:fld>
             <a:endParaRPr lang="en-US"/>
           </a:p>
@@ -2387,7 +2387,7 @@
           <a:p>
             <a:fld id="{AC5FDBF2-827B-41F1-ABE5-AC1D821AC5D9}" type="datetimeFigureOut">
               <a:rPr lang="en-US" smtClean="0"/>
-              <a:t>5/15/2021</a:t>
+              <a:t>5/17/2021</a:t>
             </a:fld>
             <a:endParaRPr lang="en-US"/>
           </a:p>
@@ -2675,7 +2675,7 @@
           <a:p>
             <a:fld id="{AC5FDBF2-827B-41F1-ABE5-AC1D821AC5D9}" type="datetimeFigureOut">
               <a:rPr lang="en-US" smtClean="0"/>
-              <a:t>5/15/2021</a:t>
+              <a:t>5/17/2021</a:t>
             </a:fld>
             <a:endParaRPr lang="en-US"/>
           </a:p>
@@ -2916,7 +2916,7 @@
           <a:p>
             <a:fld id="{AC5FDBF2-827B-41F1-ABE5-AC1D821AC5D9}" type="datetimeFigureOut">
               <a:rPr lang="en-US" smtClean="0"/>
-              <a:t>5/15/2021</a:t>
+              <a:t>5/17/2021</a:t>
             </a:fld>
             <a:endParaRPr lang="en-US"/>
           </a:p>
@@ -4223,10 +4223,10 @@
       </p:sp>
       <p:pic>
         <p:nvPicPr>
-          <p:cNvPr id="4" name="Picture 3">
-            <a:extLst>
-              <a:ext uri="{FF2B5EF4-FFF2-40B4-BE49-F238E27FC236}">
-                <a16:creationId xmlns:a16="http://schemas.microsoft.com/office/drawing/2014/main" id="{0FB962A6-3096-49BD-A551-155CEBB09614}"/>
+          <p:cNvPr id="5" name="Picture 4">
+            <a:extLst>
+              <a:ext uri="{FF2B5EF4-FFF2-40B4-BE49-F238E27FC236}">
+                <a16:creationId xmlns:a16="http://schemas.microsoft.com/office/drawing/2014/main" id="{87F82055-C781-4498-9AFB-D1076935ADA1}"/>
               </a:ext>
             </a:extLst>
           </p:cNvPr>
@@ -4243,8 +4243,8 @@
         </p:blipFill>
         <p:spPr>
           <a:xfrm>
-            <a:off x="188863" y="1579418"/>
-            <a:ext cx="4206617" cy="4216400"/>
+            <a:off x="69505" y="1459674"/>
+            <a:ext cx="4635473" cy="4425043"/>
           </a:xfrm>
           <a:prstGeom prst="rect">
             <a:avLst/>

</xml_diff>